<commit_message>
Se añadio la documentación para desarrolladores
</commit_message>
<xml_diff>
--- a/4X-documentacion/diagrama.pptx
+++ b/4X-documentacion/diagrama.pptx
@@ -6,6 +6,7 @@
   </p:sldMasterIdLst>
   <p:sldIdLst>
     <p:sldId id="257" r:id="rId2"/>
+    <p:sldId id="258" r:id="rId3"/>
   </p:sldIdLst>
   <p:sldSz cx="12192000" cy="6858000"/>
   <p:notesSz cx="6858000" cy="9144000"/>
@@ -261,7 +262,7 @@
           <a:p>
             <a:fld id="{7068EA7C-4FB9-42FD-8E41-2671CBA671F9}" type="datetimeFigureOut">
               <a:rPr lang="es-PE" smtClean="0"/>
-              <a:t>4/06/2020</a:t>
+              <a:t>15/06/2020</a:t>
             </a:fld>
             <a:endParaRPr lang="es-PE"/>
           </a:p>
@@ -461,7 +462,7 @@
           <a:p>
             <a:fld id="{7068EA7C-4FB9-42FD-8E41-2671CBA671F9}" type="datetimeFigureOut">
               <a:rPr lang="es-PE" smtClean="0"/>
-              <a:t>4/06/2020</a:t>
+              <a:t>15/06/2020</a:t>
             </a:fld>
             <a:endParaRPr lang="es-PE"/>
           </a:p>
@@ -671,7 +672,7 @@
           <a:p>
             <a:fld id="{7068EA7C-4FB9-42FD-8E41-2671CBA671F9}" type="datetimeFigureOut">
               <a:rPr lang="es-PE" smtClean="0"/>
-              <a:t>4/06/2020</a:t>
+              <a:t>15/06/2020</a:t>
             </a:fld>
             <a:endParaRPr lang="es-PE"/>
           </a:p>
@@ -871,7 +872,7 @@
           <a:p>
             <a:fld id="{7068EA7C-4FB9-42FD-8E41-2671CBA671F9}" type="datetimeFigureOut">
               <a:rPr lang="es-PE" smtClean="0"/>
-              <a:t>4/06/2020</a:t>
+              <a:t>15/06/2020</a:t>
             </a:fld>
             <a:endParaRPr lang="es-PE"/>
           </a:p>
@@ -1147,7 +1148,7 @@
           <a:p>
             <a:fld id="{7068EA7C-4FB9-42FD-8E41-2671CBA671F9}" type="datetimeFigureOut">
               <a:rPr lang="es-PE" smtClean="0"/>
-              <a:t>4/06/2020</a:t>
+              <a:t>15/06/2020</a:t>
             </a:fld>
             <a:endParaRPr lang="es-PE"/>
           </a:p>
@@ -1415,7 +1416,7 @@
           <a:p>
             <a:fld id="{7068EA7C-4FB9-42FD-8E41-2671CBA671F9}" type="datetimeFigureOut">
               <a:rPr lang="es-PE" smtClean="0"/>
-              <a:t>4/06/2020</a:t>
+              <a:t>15/06/2020</a:t>
             </a:fld>
             <a:endParaRPr lang="es-PE"/>
           </a:p>
@@ -1830,7 +1831,7 @@
           <a:p>
             <a:fld id="{7068EA7C-4FB9-42FD-8E41-2671CBA671F9}" type="datetimeFigureOut">
               <a:rPr lang="es-PE" smtClean="0"/>
-              <a:t>4/06/2020</a:t>
+              <a:t>15/06/2020</a:t>
             </a:fld>
             <a:endParaRPr lang="es-PE"/>
           </a:p>
@@ -1972,7 +1973,7 @@
           <a:p>
             <a:fld id="{7068EA7C-4FB9-42FD-8E41-2671CBA671F9}" type="datetimeFigureOut">
               <a:rPr lang="es-PE" smtClean="0"/>
-              <a:t>4/06/2020</a:t>
+              <a:t>15/06/2020</a:t>
             </a:fld>
             <a:endParaRPr lang="es-PE"/>
           </a:p>
@@ -2085,7 +2086,7 @@
           <a:p>
             <a:fld id="{7068EA7C-4FB9-42FD-8E41-2671CBA671F9}" type="datetimeFigureOut">
               <a:rPr lang="es-PE" smtClean="0"/>
-              <a:t>4/06/2020</a:t>
+              <a:t>15/06/2020</a:t>
             </a:fld>
             <a:endParaRPr lang="es-PE"/>
           </a:p>
@@ -2398,7 +2399,7 @@
           <a:p>
             <a:fld id="{7068EA7C-4FB9-42FD-8E41-2671CBA671F9}" type="datetimeFigureOut">
               <a:rPr lang="es-PE" smtClean="0"/>
-              <a:t>4/06/2020</a:t>
+              <a:t>15/06/2020</a:t>
             </a:fld>
             <a:endParaRPr lang="es-PE"/>
           </a:p>
@@ -2687,7 +2688,7 @@
           <a:p>
             <a:fld id="{7068EA7C-4FB9-42FD-8E41-2671CBA671F9}" type="datetimeFigureOut">
               <a:rPr lang="es-PE" smtClean="0"/>
-              <a:t>4/06/2020</a:t>
+              <a:t>15/06/2020</a:t>
             </a:fld>
             <a:endParaRPr lang="es-PE"/>
           </a:p>
@@ -2930,7 +2931,7 @@
           <a:p>
             <a:fld id="{7068EA7C-4FB9-42FD-8E41-2671CBA671F9}" type="datetimeFigureOut">
               <a:rPr lang="es-PE" smtClean="0"/>
-              <a:t>4/06/2020</a:t>
+              <a:t>15/06/2020</a:t>
             </a:fld>
             <a:endParaRPr lang="es-PE"/>
           </a:p>
@@ -5595,6 +5596,850 @@
 </p:sld>
 </file>
 
+<file path=ppt/slides/slide2.xml><?xml version="1.0" encoding="utf-8"?>
+<p:sld xmlns:a="http://schemas.openxmlformats.org/drawingml/2006/main" xmlns:r="http://schemas.openxmlformats.org/officeDocument/2006/relationships" xmlns:p="http://schemas.openxmlformats.org/presentationml/2006/main">
+  <p:cSld>
+    <p:spTree>
+      <p:nvGrpSpPr>
+        <p:cNvPr id="1" name=""/>
+        <p:cNvGrpSpPr/>
+        <p:nvPr/>
+      </p:nvGrpSpPr>
+      <p:grpSpPr>
+        <a:xfrm>
+          <a:off x="0" y="0"/>
+          <a:ext cx="0" cy="0"/>
+          <a:chOff x="0" y="0"/>
+          <a:chExt cx="0" cy="0"/>
+        </a:xfrm>
+      </p:grpSpPr>
+      <p:pic>
+        <p:nvPicPr>
+          <p:cNvPr id="1034" name="Picture 10" descr="Wifi símbolo dwg bloque -CAD blocks free">
+            <a:extLst>
+              <a:ext uri="{FF2B5EF4-FFF2-40B4-BE49-F238E27FC236}">
+                <a16:creationId xmlns:a16="http://schemas.microsoft.com/office/drawing/2014/main" id="{660083EF-96BD-47BD-BDCF-60E700193FE8}"/>
+              </a:ext>
+            </a:extLst>
+          </p:cNvPr>
+          <p:cNvPicPr>
+            <a:picLocks noChangeAspect="1" noChangeArrowheads="1"/>
+          </p:cNvPicPr>
+          <p:nvPr/>
+        </p:nvPicPr>
+        <p:blipFill>
+          <a:blip r:embed="rId2">
+            <a:extLst>
+              <a:ext uri="{28A0092B-C50C-407E-A947-70E740481C1C}">
+                <a14:useLocalDpi xmlns:a14="http://schemas.microsoft.com/office/drawing/2010/main" val="0"/>
+              </a:ext>
+            </a:extLst>
+          </a:blip>
+          <a:srcRect/>
+          <a:stretch>
+            <a:fillRect/>
+          </a:stretch>
+        </p:blipFill>
+        <p:spPr bwMode="auto">
+          <a:xfrm>
+            <a:off x="794187" y="3352676"/>
+            <a:ext cx="1085707" cy="962894"/>
+          </a:xfrm>
+          <a:prstGeom prst="rect">
+            <a:avLst/>
+          </a:prstGeom>
+          <a:noFill/>
+          <a:extLst>
+            <a:ext uri="{909E8E84-426E-40DD-AFC4-6F175D3DCCD1}">
+              <a14:hiddenFill xmlns:a14="http://schemas.microsoft.com/office/drawing/2010/main">
+                <a:solidFill>
+                  <a:srgbClr val="FFFFFF"/>
+                </a:solidFill>
+              </a14:hiddenFill>
+            </a:ext>
+          </a:extLst>
+        </p:spPr>
+      </p:pic>
+      <p:sp>
+        <p:nvSpPr>
+          <p:cNvPr id="5" name="Rectángulo: esquinas redondeadas 4">
+            <a:extLst>
+              <a:ext uri="{FF2B5EF4-FFF2-40B4-BE49-F238E27FC236}">
+                <a16:creationId xmlns:a16="http://schemas.microsoft.com/office/drawing/2014/main" id="{693A65AC-9B22-45FE-8364-82CDB4740968}"/>
+              </a:ext>
+            </a:extLst>
+          </p:cNvPr>
+          <p:cNvSpPr/>
+          <p:nvPr/>
+        </p:nvSpPr>
+        <p:spPr>
+          <a:xfrm>
+            <a:off x="334027" y="391438"/>
+            <a:ext cx="11515073" cy="6136362"/>
+          </a:xfrm>
+          <a:prstGeom prst="roundRect">
+            <a:avLst>
+              <a:gd name="adj" fmla="val 0"/>
+            </a:avLst>
+          </a:prstGeom>
+          <a:noFill/>
+          <a:ln w="9525" cap="flat" cmpd="sng" algn="ctr">
+            <a:solidFill>
+              <a:schemeClr val="accent5">
+                <a:lumMod val="60000"/>
+                <a:lumOff val="40000"/>
+              </a:schemeClr>
+            </a:solidFill>
+            <a:prstDash val="solid"/>
+            <a:round/>
+            <a:headEnd type="none" w="med" len="med"/>
+            <a:tailEnd type="none" w="med" len="med"/>
+          </a:ln>
+          <a:effectLst>
+            <a:glow rad="63500">
+              <a:schemeClr val="accent1">
+                <a:satMod val="175000"/>
+                <a:alpha val="40000"/>
+              </a:schemeClr>
+            </a:glow>
+          </a:effectLst>
+        </p:spPr>
+        <p:style>
+          <a:lnRef idx="0">
+            <a:scrgbClr r="0" g="0" b="0"/>
+          </a:lnRef>
+          <a:fillRef idx="0">
+            <a:scrgbClr r="0" g="0" b="0"/>
+          </a:fillRef>
+          <a:effectRef idx="0">
+            <a:scrgbClr r="0" g="0" b="0"/>
+          </a:effectRef>
+          <a:fontRef idx="minor">
+            <a:schemeClr val="accent1"/>
+          </a:fontRef>
+        </p:style>
+        <p:txBody>
+          <a:bodyPr rtlCol="0" anchor="ctr"/>
+          <a:lstStyle/>
+          <a:p>
+            <a:pPr algn="ctr"/>
+            <a:endParaRPr lang="es-PE"/>
+          </a:p>
+        </p:txBody>
+      </p:sp>
+      <p:pic>
+        <p:nvPicPr>
+          <p:cNvPr id="1026" name="Picture 2" descr="NodeMCU microcontroller board with ESP8266 and Lua - Elektor">
+            <a:extLst>
+              <a:ext uri="{FF2B5EF4-FFF2-40B4-BE49-F238E27FC236}">
+                <a16:creationId xmlns:a16="http://schemas.microsoft.com/office/drawing/2014/main" id="{B73F03E2-C5C2-4D84-9C9E-DE5129FCFEFA}"/>
+              </a:ext>
+            </a:extLst>
+          </p:cNvPr>
+          <p:cNvPicPr>
+            <a:picLocks noChangeAspect="1" noChangeArrowheads="1"/>
+          </p:cNvPicPr>
+          <p:nvPr/>
+        </p:nvPicPr>
+        <p:blipFill>
+          <a:blip r:embed="rId3">
+            <a:extLst>
+              <a:ext uri="{28A0092B-C50C-407E-A947-70E740481C1C}">
+                <a14:useLocalDpi xmlns:a14="http://schemas.microsoft.com/office/drawing/2010/main" val="0"/>
+              </a:ext>
+            </a:extLst>
+          </a:blip>
+          <a:srcRect/>
+          <a:stretch>
+            <a:fillRect/>
+          </a:stretch>
+        </p:blipFill>
+        <p:spPr bwMode="auto">
+          <a:xfrm>
+            <a:off x="1341633" y="4691689"/>
+            <a:ext cx="2336799" cy="1498472"/>
+          </a:xfrm>
+          <a:prstGeom prst="rect">
+            <a:avLst/>
+          </a:prstGeom>
+          <a:noFill/>
+          <a:extLst>
+            <a:ext uri="{909E8E84-426E-40DD-AFC4-6F175D3DCCD1}">
+              <a14:hiddenFill xmlns:a14="http://schemas.microsoft.com/office/drawing/2010/main">
+                <a:solidFill>
+                  <a:srgbClr val="FFFFFF"/>
+                </a:solidFill>
+              </a14:hiddenFill>
+            </a:ext>
+          </a:extLst>
+        </p:spPr>
+      </p:pic>
+      <p:pic>
+        <p:nvPicPr>
+          <p:cNvPr id="7" name="Imagen 6" descr="Imagen que contiene azul, camioneta, calle, estacionado&#10;&#10;Descripción generada automáticamente">
+            <a:extLst>
+              <a:ext uri="{FF2B5EF4-FFF2-40B4-BE49-F238E27FC236}">
+                <a16:creationId xmlns:a16="http://schemas.microsoft.com/office/drawing/2014/main" id="{56E8A095-6F14-4BEA-BA95-247B29B38171}"/>
+              </a:ext>
+            </a:extLst>
+          </p:cNvPr>
+          <p:cNvPicPr>
+            <a:picLocks noChangeAspect="1"/>
+          </p:cNvPicPr>
+          <p:nvPr/>
+        </p:nvPicPr>
+        <p:blipFill>
+          <a:blip r:embed="rId4">
+            <a:extLst>
+              <a:ext uri="{28A0092B-C50C-407E-A947-70E740481C1C}">
+                <a14:useLocalDpi xmlns:a14="http://schemas.microsoft.com/office/drawing/2010/main" val="0"/>
+              </a:ext>
+            </a:extLst>
+          </a:blip>
+          <a:stretch>
+            <a:fillRect/>
+          </a:stretch>
+        </p:blipFill>
+        <p:spPr>
+          <a:xfrm>
+            <a:off x="556995" y="4983282"/>
+            <a:ext cx="1029575" cy="1073017"/>
+          </a:xfrm>
+          <a:prstGeom prst="rect">
+            <a:avLst/>
+          </a:prstGeom>
+        </p:spPr>
+      </p:pic>
+      <p:pic>
+        <p:nvPicPr>
+          <p:cNvPr id="1030" name="Picture 6" descr="Montar un API REST con NodeJs y Express">
+            <a:extLst>
+              <a:ext uri="{FF2B5EF4-FFF2-40B4-BE49-F238E27FC236}">
+                <a16:creationId xmlns:a16="http://schemas.microsoft.com/office/drawing/2014/main" id="{717EBED4-C10B-4193-9EF1-376B1A515357}"/>
+              </a:ext>
+            </a:extLst>
+          </p:cNvPr>
+          <p:cNvPicPr>
+            <a:picLocks noChangeAspect="1" noChangeArrowheads="1"/>
+          </p:cNvPicPr>
+          <p:nvPr/>
+        </p:nvPicPr>
+        <p:blipFill rotWithShape="1">
+          <a:blip r:embed="rId5">
+            <a:extLst>
+              <a:ext uri="{28A0092B-C50C-407E-A947-70E740481C1C}">
+                <a14:useLocalDpi xmlns:a14="http://schemas.microsoft.com/office/drawing/2010/main" val="0"/>
+              </a:ext>
+            </a:extLst>
+          </a:blip>
+          <a:srcRect l="52667" t="13408" b="16917"/>
+          <a:stretch/>
+        </p:blipFill>
+        <p:spPr bwMode="auto">
+          <a:xfrm>
+            <a:off x="1804623" y="944129"/>
+            <a:ext cx="3043328" cy="2979034"/>
+          </a:xfrm>
+          <a:prstGeom prst="rect">
+            <a:avLst/>
+          </a:prstGeom>
+          <a:noFill/>
+          <a:extLst>
+            <a:ext uri="{909E8E84-426E-40DD-AFC4-6F175D3DCCD1}">
+              <a14:hiddenFill xmlns:a14="http://schemas.microsoft.com/office/drawing/2010/main">
+                <a:solidFill>
+                  <a:srgbClr val="FFFFFF"/>
+                </a:solidFill>
+              </a14:hiddenFill>
+            </a:ext>
+          </a:extLst>
+        </p:spPr>
+      </p:pic>
+      <p:pic>
+        <p:nvPicPr>
+          <p:cNvPr id="1032" name="Picture 8" descr="Samsung Galaxy Tab 10.1, precio y disponibilidad en España">
+            <a:extLst>
+              <a:ext uri="{FF2B5EF4-FFF2-40B4-BE49-F238E27FC236}">
+                <a16:creationId xmlns:a16="http://schemas.microsoft.com/office/drawing/2014/main" id="{5FBE6F00-0DA1-4414-901E-54D1329E2514}"/>
+              </a:ext>
+            </a:extLst>
+          </p:cNvPr>
+          <p:cNvPicPr>
+            <a:picLocks noChangeAspect="1" noChangeArrowheads="1"/>
+          </p:cNvPicPr>
+          <p:nvPr/>
+        </p:nvPicPr>
+        <p:blipFill rotWithShape="1">
+          <a:blip r:embed="rId6">
+            <a:extLst>
+              <a:ext uri="{28A0092B-C50C-407E-A947-70E740481C1C}">
+                <a14:useLocalDpi xmlns:a14="http://schemas.microsoft.com/office/drawing/2010/main" val="0"/>
+              </a:ext>
+            </a:extLst>
+          </a:blip>
+          <a:srcRect l="21555" r="4963" b="23409"/>
+          <a:stretch/>
+        </p:blipFill>
+        <p:spPr bwMode="auto">
+          <a:xfrm>
+            <a:off x="9134474" y="1216350"/>
+            <a:ext cx="2527300" cy="1797156"/>
+          </a:xfrm>
+          <a:prstGeom prst="rect">
+            <a:avLst/>
+          </a:prstGeom>
+          <a:noFill/>
+          <a:extLst>
+            <a:ext uri="{909E8E84-426E-40DD-AFC4-6F175D3DCCD1}">
+              <a14:hiddenFill xmlns:a14="http://schemas.microsoft.com/office/drawing/2010/main">
+                <a:solidFill>
+                  <a:srgbClr val="FFFFFF"/>
+                </a:solidFill>
+              </a14:hiddenFill>
+            </a:ext>
+          </a:extLst>
+        </p:spPr>
+      </p:pic>
+      <p:pic>
+        <p:nvPicPr>
+          <p:cNvPr id="13" name="Picture 10" descr="Wifi símbolo dwg bloque -CAD blocks free">
+            <a:extLst>
+              <a:ext uri="{FF2B5EF4-FFF2-40B4-BE49-F238E27FC236}">
+                <a16:creationId xmlns:a16="http://schemas.microsoft.com/office/drawing/2014/main" id="{9EBCD6CC-3E48-4E4E-94E1-3682BF90A34C}"/>
+              </a:ext>
+            </a:extLst>
+          </p:cNvPr>
+          <p:cNvPicPr>
+            <a:picLocks noChangeAspect="1" noChangeArrowheads="1"/>
+          </p:cNvPicPr>
+          <p:nvPr/>
+        </p:nvPicPr>
+        <p:blipFill>
+          <a:blip r:embed="rId2">
+            <a:extLst>
+              <a:ext uri="{28A0092B-C50C-407E-A947-70E740481C1C}">
+                <a14:useLocalDpi xmlns:a14="http://schemas.microsoft.com/office/drawing/2010/main" val="0"/>
+              </a:ext>
+            </a:extLst>
+          </a:blip>
+          <a:srcRect/>
+          <a:stretch>
+            <a:fillRect/>
+          </a:stretch>
+        </p:blipFill>
+        <p:spPr bwMode="auto">
+          <a:xfrm>
+            <a:off x="9992454" y="501552"/>
+            <a:ext cx="936605" cy="830657"/>
+          </a:xfrm>
+          <a:prstGeom prst="rect">
+            <a:avLst/>
+          </a:prstGeom>
+          <a:noFill/>
+          <a:extLst>
+            <a:ext uri="{909E8E84-426E-40DD-AFC4-6F175D3DCCD1}">
+              <a14:hiddenFill xmlns:a14="http://schemas.microsoft.com/office/drawing/2010/main">
+                <a:solidFill>
+                  <a:srgbClr val="FFFFFF"/>
+                </a:solidFill>
+              </a14:hiddenFill>
+            </a:ext>
+          </a:extLst>
+        </p:spPr>
+      </p:pic>
+      <p:sp>
+        <p:nvSpPr>
+          <p:cNvPr id="8" name="CuadroTexto 7">
+            <a:extLst>
+              <a:ext uri="{FF2B5EF4-FFF2-40B4-BE49-F238E27FC236}">
+                <a16:creationId xmlns:a16="http://schemas.microsoft.com/office/drawing/2014/main" id="{A8A0D8D0-AEF6-4B6D-B8D0-2E1A4461DD8D}"/>
+              </a:ext>
+            </a:extLst>
+          </p:cNvPr>
+          <p:cNvSpPr txBox="1"/>
+          <p:nvPr/>
+        </p:nvSpPr>
+        <p:spPr>
+          <a:xfrm>
+            <a:off x="358354" y="498473"/>
+            <a:ext cx="3575017" cy="461665"/>
+          </a:xfrm>
+          <a:prstGeom prst="rect">
+            <a:avLst/>
+          </a:prstGeom>
+          <a:noFill/>
+        </p:spPr>
+        <p:txBody>
+          <a:bodyPr wrap="square" rtlCol="0">
+            <a:spAutoFit/>
+          </a:bodyPr>
+          <a:lstStyle/>
+          <a:p>
+            <a:r>
+              <a:rPr lang="es-PE" sz="2400" dirty="0">
+                <a:latin typeface="Consolas" panose="020B0609020204030204" pitchFamily="49" charset="0"/>
+              </a:rPr>
+              <a:t>LAN: 172.168.100.X</a:t>
+            </a:r>
+          </a:p>
+        </p:txBody>
+      </p:sp>
+      <p:sp>
+        <p:nvSpPr>
+          <p:cNvPr id="15" name="CuadroTexto 14">
+            <a:extLst>
+              <a:ext uri="{FF2B5EF4-FFF2-40B4-BE49-F238E27FC236}">
+                <a16:creationId xmlns:a16="http://schemas.microsoft.com/office/drawing/2014/main" id="{290A6DB8-018A-41B9-B2D5-7A102353D3F8}"/>
+              </a:ext>
+            </a:extLst>
+          </p:cNvPr>
+          <p:cNvSpPr txBox="1"/>
+          <p:nvPr/>
+        </p:nvSpPr>
+        <p:spPr>
+          <a:xfrm>
+            <a:off x="644898" y="4653209"/>
+            <a:ext cx="2727745" cy="338554"/>
+          </a:xfrm>
+          <a:prstGeom prst="rect">
+            <a:avLst/>
+          </a:prstGeom>
+          <a:noFill/>
+        </p:spPr>
+        <p:txBody>
+          <a:bodyPr wrap="square" rtlCol="0">
+            <a:spAutoFit/>
+          </a:bodyPr>
+          <a:lstStyle/>
+          <a:p>
+            <a:r>
+              <a:rPr lang="es-PE" sz="1600" dirty="0">
+                <a:latin typeface="Consolas" panose="020B0609020204030204" pitchFamily="49" charset="0"/>
+              </a:rPr>
+              <a:t>LAN: 172.168.100.105</a:t>
+            </a:r>
+          </a:p>
+        </p:txBody>
+      </p:sp>
+      <p:sp>
+        <p:nvSpPr>
+          <p:cNvPr id="17" name="CuadroTexto 16">
+            <a:extLst>
+              <a:ext uri="{FF2B5EF4-FFF2-40B4-BE49-F238E27FC236}">
+                <a16:creationId xmlns:a16="http://schemas.microsoft.com/office/drawing/2014/main" id="{206B7E6E-EAFE-405A-9539-1888C1ACE43E}"/>
+              </a:ext>
+            </a:extLst>
+          </p:cNvPr>
+          <p:cNvSpPr txBox="1"/>
+          <p:nvPr/>
+        </p:nvSpPr>
+        <p:spPr>
+          <a:xfrm>
+            <a:off x="9096883" y="3090446"/>
+            <a:ext cx="2727745" cy="338554"/>
+          </a:xfrm>
+          <a:prstGeom prst="rect">
+            <a:avLst/>
+          </a:prstGeom>
+          <a:noFill/>
+        </p:spPr>
+        <p:txBody>
+          <a:bodyPr wrap="square" rtlCol="0">
+            <a:spAutoFit/>
+          </a:bodyPr>
+          <a:lstStyle/>
+          <a:p>
+            <a:r>
+              <a:rPr lang="es-PE" sz="1600" dirty="0">
+                <a:latin typeface="Consolas" panose="020B0609020204030204" pitchFamily="49" charset="0"/>
+              </a:rPr>
+              <a:t>LAN: 172.168.100.106</a:t>
+            </a:r>
+          </a:p>
+        </p:txBody>
+      </p:sp>
+      <p:cxnSp>
+        <p:nvCxnSpPr>
+          <p:cNvPr id="10" name="Conector recto de flecha 9">
+            <a:extLst>
+              <a:ext uri="{FF2B5EF4-FFF2-40B4-BE49-F238E27FC236}">
+                <a16:creationId xmlns:a16="http://schemas.microsoft.com/office/drawing/2014/main" id="{A1EFB613-B490-41E2-8BB7-48E545FB3B92}"/>
+              </a:ext>
+            </a:extLst>
+          </p:cNvPr>
+          <p:cNvCxnSpPr>
+            <a:cxnSpLocks/>
+          </p:cNvCxnSpPr>
+          <p:nvPr/>
+        </p:nvCxnSpPr>
+        <p:spPr>
+          <a:xfrm flipH="1">
+            <a:off x="4847951" y="1866378"/>
+            <a:ext cx="4152852" cy="0"/>
+          </a:xfrm>
+          <a:prstGeom prst="straightConnector1">
+            <a:avLst/>
+          </a:prstGeom>
+          <a:ln w="57150">
+            <a:solidFill>
+              <a:srgbClr val="0070C0"/>
+            </a:solidFill>
+            <a:tailEnd type="triangle"/>
+          </a:ln>
+        </p:spPr>
+        <p:style>
+          <a:lnRef idx="1">
+            <a:schemeClr val="accent1"/>
+          </a:lnRef>
+          <a:fillRef idx="0">
+            <a:schemeClr val="accent1"/>
+          </a:fillRef>
+          <a:effectRef idx="0">
+            <a:schemeClr val="accent1"/>
+          </a:effectRef>
+          <a:fontRef idx="minor">
+            <a:schemeClr val="tx1"/>
+          </a:fontRef>
+        </p:style>
+      </p:cxnSp>
+      <p:sp>
+        <p:nvSpPr>
+          <p:cNvPr id="23" name="CuadroTexto 22">
+            <a:extLst>
+              <a:ext uri="{FF2B5EF4-FFF2-40B4-BE49-F238E27FC236}">
+                <a16:creationId xmlns:a16="http://schemas.microsoft.com/office/drawing/2014/main" id="{8544C3DF-4ACC-4BE9-AA61-F354E5CA28DC}"/>
+              </a:ext>
+            </a:extLst>
+          </p:cNvPr>
+          <p:cNvSpPr txBox="1"/>
+          <p:nvPr/>
+        </p:nvSpPr>
+        <p:spPr>
+          <a:xfrm>
+            <a:off x="4972833" y="1527109"/>
+            <a:ext cx="4217391" cy="276999"/>
+          </a:xfrm>
+          <a:prstGeom prst="rect">
+            <a:avLst/>
+          </a:prstGeom>
+          <a:noFill/>
+        </p:spPr>
+        <p:txBody>
+          <a:bodyPr wrap="square" rtlCol="0">
+            <a:spAutoFit/>
+          </a:bodyPr>
+          <a:lstStyle/>
+          <a:p>
+            <a:r>
+              <a:rPr lang="es-PE" sz="1200" dirty="0">
+                <a:latin typeface="Consolas" panose="020B0609020204030204" pitchFamily="49" charset="0"/>
+              </a:rPr>
+              <a:t>API REQUEST GET: 172.168.100.105/temperatura/</a:t>
+            </a:r>
+            <a:r>
+              <a:rPr lang="es-PE" sz="1200" b="1" dirty="0">
+                <a:latin typeface="Consolas" panose="020B0609020204030204" pitchFamily="49" charset="0"/>
+              </a:rPr>
+              <a:t>1</a:t>
+            </a:r>
+          </a:p>
+        </p:txBody>
+      </p:sp>
+      <p:cxnSp>
+        <p:nvCxnSpPr>
+          <p:cNvPr id="19" name="Conector recto de flecha 18">
+            <a:extLst>
+              <a:ext uri="{FF2B5EF4-FFF2-40B4-BE49-F238E27FC236}">
+                <a16:creationId xmlns:a16="http://schemas.microsoft.com/office/drawing/2014/main" id="{8CF21FB1-9600-4FB4-AAC3-D3A11796D552}"/>
+              </a:ext>
+            </a:extLst>
+          </p:cNvPr>
+          <p:cNvCxnSpPr>
+            <a:cxnSpLocks/>
+          </p:cNvCxnSpPr>
+          <p:nvPr/>
+        </p:nvCxnSpPr>
+        <p:spPr>
+          <a:xfrm>
+            <a:off x="4972833" y="2342367"/>
+            <a:ext cx="4027968" cy="0"/>
+          </a:xfrm>
+          <a:prstGeom prst="straightConnector1">
+            <a:avLst/>
+          </a:prstGeom>
+          <a:ln w="57150">
+            <a:tailEnd type="triangle"/>
+          </a:ln>
+        </p:spPr>
+        <p:style>
+          <a:lnRef idx="1">
+            <a:schemeClr val="accent1"/>
+          </a:lnRef>
+          <a:fillRef idx="0">
+            <a:schemeClr val="accent1"/>
+          </a:fillRef>
+          <a:effectRef idx="0">
+            <a:schemeClr val="accent1"/>
+          </a:effectRef>
+          <a:fontRef idx="minor">
+            <a:schemeClr val="tx1"/>
+          </a:fontRef>
+        </p:style>
+      </p:cxnSp>
+      <p:sp>
+        <p:nvSpPr>
+          <p:cNvPr id="29" name="CuadroTexto 28">
+            <a:extLst>
+              <a:ext uri="{FF2B5EF4-FFF2-40B4-BE49-F238E27FC236}">
+                <a16:creationId xmlns:a16="http://schemas.microsoft.com/office/drawing/2014/main" id="{E0E941A1-E311-43B7-8EB4-2CF07F4679FD}"/>
+              </a:ext>
+            </a:extLst>
+          </p:cNvPr>
+          <p:cNvSpPr txBox="1"/>
+          <p:nvPr/>
+        </p:nvSpPr>
+        <p:spPr>
+          <a:xfrm>
+            <a:off x="4981622" y="2481820"/>
+            <a:ext cx="3837736" cy="3354765"/>
+          </a:xfrm>
+          <a:prstGeom prst="rect">
+            <a:avLst/>
+          </a:prstGeom>
+          <a:noFill/>
+        </p:spPr>
+        <p:txBody>
+          <a:bodyPr wrap="square" rtlCol="0">
+            <a:spAutoFit/>
+          </a:bodyPr>
+          <a:lstStyle/>
+          <a:p>
+            <a:r>
+              <a:rPr lang="es-PE" sz="1200" dirty="0">
+                <a:latin typeface="Consolas" panose="020B0609020204030204" pitchFamily="49" charset="0"/>
+              </a:rPr>
+              <a:t>API RESPONSE JSON </a:t>
+            </a:r>
+          </a:p>
+          <a:p>
+            <a:r>
+              <a:rPr lang="es-PE" sz="1200" b="1" dirty="0">
+                <a:latin typeface="Consolas" panose="020B0609020204030204" pitchFamily="49" charset="0"/>
+              </a:rPr>
+              <a:t>Si las toma de temperatura es correcta:</a:t>
+            </a:r>
+          </a:p>
+          <a:p>
+            <a:r>
+              <a:rPr lang="es-ES" sz="1100" dirty="0"/>
+              <a:t>         {</a:t>
+            </a:r>
+          </a:p>
+          <a:p>
+            <a:r>
+              <a:rPr lang="es-ES" sz="1100" dirty="0"/>
+              <a:t>                 "status": "</a:t>
+            </a:r>
+            <a:r>
+              <a:rPr lang="es-ES" sz="1100" dirty="0" err="1"/>
+              <a:t>success</a:t>
+            </a:r>
+            <a:r>
+              <a:rPr lang="es-ES" sz="1100" dirty="0"/>
+              <a:t>",</a:t>
+            </a:r>
+          </a:p>
+          <a:p>
+            <a:r>
+              <a:rPr lang="es-ES" sz="1100" dirty="0"/>
+              <a:t>                 "</a:t>
+            </a:r>
+            <a:r>
+              <a:rPr lang="es-ES" sz="1100" dirty="0" err="1"/>
+              <a:t>temperature</a:t>
+            </a:r>
+            <a:r>
+              <a:rPr lang="es-ES" sz="1100" dirty="0"/>
+              <a:t>": "37“</a:t>
+            </a:r>
+          </a:p>
+          <a:p>
+            <a:r>
+              <a:rPr lang="es-ES" sz="1100" dirty="0"/>
+              <a:t>          }</a:t>
+            </a:r>
+          </a:p>
+          <a:p>
+            <a:r>
+              <a:rPr lang="es-PE" sz="1100" b="1" dirty="0">
+                <a:latin typeface="Consolas" panose="020B0609020204030204" pitchFamily="49" charset="0"/>
+              </a:rPr>
+              <a:t>Si el sensor no encontró un usuario:</a:t>
+            </a:r>
+            <a:r>
+              <a:rPr lang="es-ES" sz="1100" dirty="0"/>
+              <a:t> </a:t>
+            </a:r>
+          </a:p>
+          <a:p>
+            <a:r>
+              <a:rPr lang="es-ES" sz="1100" dirty="0"/>
+              <a:t>          {</a:t>
+            </a:r>
+          </a:p>
+          <a:p>
+            <a:r>
+              <a:rPr lang="es-ES" sz="1100" dirty="0"/>
+              <a:t>                 "status": "</a:t>
+            </a:r>
+            <a:r>
+              <a:rPr lang="es-ES" sz="1100" dirty="0" err="1"/>
+              <a:t>warning</a:t>
+            </a:r>
+            <a:r>
+              <a:rPr lang="es-ES" sz="1100" dirty="0"/>
+              <a:t>",    </a:t>
+            </a:r>
+          </a:p>
+          <a:p>
+            <a:r>
+              <a:rPr lang="es-ES" sz="1100" dirty="0"/>
+              <a:t>                 "</a:t>
+            </a:r>
+            <a:r>
+              <a:rPr lang="es-ES" sz="1100" dirty="0" err="1"/>
+              <a:t>message</a:t>
+            </a:r>
+            <a:r>
+              <a:rPr lang="es-ES" sz="1100" dirty="0"/>
+              <a:t>": </a:t>
+            </a:r>
+          </a:p>
+          <a:p>
+            <a:r>
+              <a:rPr lang="es-ES" sz="1100" dirty="0"/>
+              <a:t>                 "Superficie del objeto no detectado" </a:t>
+            </a:r>
+          </a:p>
+          <a:p>
+            <a:r>
+              <a:rPr lang="es-ES" sz="1100" dirty="0"/>
+              <a:t>           }     </a:t>
+            </a:r>
+          </a:p>
+          <a:p>
+            <a:r>
+              <a:rPr lang="es-PE" sz="1100" b="1" dirty="0">
+                <a:latin typeface="Consolas" panose="020B0609020204030204" pitchFamily="49" charset="0"/>
+              </a:rPr>
+              <a:t>Si el sensor no está conectado o  averiado:</a:t>
+            </a:r>
+            <a:r>
+              <a:rPr lang="es-ES" sz="1100" dirty="0"/>
+              <a:t> </a:t>
+            </a:r>
+          </a:p>
+          <a:p>
+            <a:r>
+              <a:rPr lang="es-ES" sz="1100" dirty="0"/>
+              <a:t>           {</a:t>
+            </a:r>
+          </a:p>
+          <a:p>
+            <a:r>
+              <a:rPr lang="es-ES" sz="1100" dirty="0"/>
+              <a:t>                 "status": "error",</a:t>
+            </a:r>
+          </a:p>
+          <a:p>
+            <a:r>
+              <a:rPr lang="es-ES" sz="1100" dirty="0"/>
+              <a:t>                 "</a:t>
+            </a:r>
+            <a:r>
+              <a:rPr lang="es-ES" sz="1100" dirty="0" err="1"/>
+              <a:t>message</a:t>
+            </a:r>
+            <a:r>
+              <a:rPr lang="es-ES" sz="1100" dirty="0"/>
+              <a:t>": </a:t>
+            </a:r>
+          </a:p>
+          <a:p>
+            <a:r>
+              <a:rPr lang="es-ES" sz="1100" dirty="0"/>
+              <a:t>                 "Sensor averiado y no   conectado“</a:t>
+            </a:r>
+          </a:p>
+          <a:p>
+            <a:r>
+              <a:rPr lang="es-ES" sz="1100" dirty="0"/>
+              <a:t>             }</a:t>
+            </a:r>
+            <a:endParaRPr lang="es-ES" sz="1400" dirty="0"/>
+          </a:p>
+          <a:p>
+            <a:endParaRPr lang="es-PE" sz="1200" b="1" dirty="0">
+              <a:latin typeface="Consolas" panose="020B0609020204030204" pitchFamily="49" charset="0"/>
+            </a:endParaRPr>
+          </a:p>
+        </p:txBody>
+      </p:sp>
+      <p:cxnSp>
+        <p:nvCxnSpPr>
+          <p:cNvPr id="41" name="Conector recto de flecha 40">
+            <a:extLst>
+              <a:ext uri="{FF2B5EF4-FFF2-40B4-BE49-F238E27FC236}">
+                <a16:creationId xmlns:a16="http://schemas.microsoft.com/office/drawing/2014/main" id="{BFFEFA3F-A606-4C9E-B9B4-22632233AC7B}"/>
+              </a:ext>
+            </a:extLst>
+          </p:cNvPr>
+          <p:cNvCxnSpPr>
+            <a:cxnSpLocks/>
+          </p:cNvCxnSpPr>
+          <p:nvPr/>
+        </p:nvCxnSpPr>
+        <p:spPr>
+          <a:xfrm>
+            <a:off x="3322539" y="3807912"/>
+            <a:ext cx="0" cy="751562"/>
+          </a:xfrm>
+          <a:prstGeom prst="straightConnector1">
+            <a:avLst/>
+          </a:prstGeom>
+          <a:ln w="57150">
+            <a:headEnd type="triangle"/>
+            <a:tailEnd type="triangle"/>
+          </a:ln>
+        </p:spPr>
+        <p:style>
+          <a:lnRef idx="1">
+            <a:schemeClr val="accent1"/>
+          </a:lnRef>
+          <a:fillRef idx="0">
+            <a:schemeClr val="accent1"/>
+          </a:fillRef>
+          <a:effectRef idx="0">
+            <a:schemeClr val="accent1"/>
+          </a:effectRef>
+          <a:fontRef idx="minor">
+            <a:schemeClr val="tx1"/>
+          </a:fontRef>
+        </p:style>
+      </p:cxnSp>
+    </p:spTree>
+    <p:extLst>
+      <p:ext uri="{BB962C8B-B14F-4D97-AF65-F5344CB8AC3E}">
+        <p14:creationId xmlns:p14="http://schemas.microsoft.com/office/powerpoint/2010/main" val="3804217345"/>
+      </p:ext>
+    </p:extLst>
+  </p:cSld>
+  <p:clrMapOvr>
+    <a:masterClrMapping/>
+  </p:clrMapOvr>
+</p:sld>
+</file>
+
 <file path=ppt/theme/theme1.xml><?xml version="1.0" encoding="utf-8"?>
 <a:theme xmlns:a="http://schemas.openxmlformats.org/drawingml/2006/main" name="Tema de Office">
   <a:themeElements>

</xml_diff>